<commit_message>
permutation importance and surrogate tree model
</commit_message>
<xml_diff>
--- a/presentation/cs109a_final_presentation.pptx
+++ b/presentation/cs109a_final_presentation.pptx
@@ -6847,8 +6847,8 @@
         </p:nvSpPr>
         <p:spPr>
           <a:xfrm>
-            <a:off x="311700" y="1339263"/>
-            <a:ext cx="8520600" cy="1519500"/>
+            <a:off x="311700" y="1162906"/>
+            <a:ext cx="8520600" cy="1232487"/>
           </a:xfrm>
           <a:prstGeom prst="rect">
             <a:avLst/>
@@ -6856,7 +6856,7 @@
         </p:spPr>
         <p:txBody>
           <a:bodyPr spcFirstLastPara="1" wrap="square" lIns="91425" tIns="91425" rIns="91425" bIns="91425" anchor="b" anchorCtr="0">
-            <a:normAutofit fontScale="90000"/>
+            <a:normAutofit/>
           </a:bodyPr>
           <a:lstStyle/>
           <a:p>
@@ -6888,10 +6888,10 @@
               <a:buNone/>
             </a:pPr>
             <a:r>
-              <a:rPr lang="en-US" sz="3600" dirty="0"/>
+              <a:rPr lang="en-US" sz="2700" dirty="0"/>
               <a:t>Predicting Hospital Readmission Rates for Diabetes</a:t>
             </a:r>
-            <a:endParaRPr sz="3600" dirty="0"/>
+            <a:endParaRPr sz="2700" dirty="0"/>
           </a:p>
         </p:txBody>
       </p:sp>
@@ -7292,10 +7292,10 @@
               <a:buNone/>
             </a:pPr>
             <a:r>
-              <a:rPr lang="en"/>
-              <a:t>AUROC &amp; Precision/Recall Curve on Test Set</a:t>
+              <a:rPr lang="en" dirty="0"/>
+              <a:t>Model Interpretation</a:t>
             </a:r>
-            <a:endParaRPr/>
+            <a:endParaRPr dirty="0"/>
           </a:p>
         </p:txBody>
       </p:sp>
@@ -7621,100 +7621,6 @@
               <a:t>Data &amp; EDA</a:t>
             </a:r>
             <a:endParaRPr/>
-          </a:p>
-        </p:txBody>
-      </p:sp>
-      <p:sp>
-        <p:nvSpPr>
-          <p:cNvPr id="63" name="Google Shape;63;p14"/>
-          <p:cNvSpPr txBox="1"/>
-          <p:nvPr/>
-        </p:nvSpPr>
-        <p:spPr>
-          <a:xfrm>
-            <a:off x="-39550" y="873175"/>
-            <a:ext cx="2715600" cy="1046700"/>
-          </a:xfrm>
-          <a:prstGeom prst="rect">
-            <a:avLst/>
-          </a:prstGeom>
-          <a:noFill/>
-          <a:ln>
-            <a:noFill/>
-          </a:ln>
-        </p:spPr>
-        <p:txBody>
-          <a:bodyPr spcFirstLastPara="1" wrap="square" lIns="91425" tIns="91425" rIns="91425" bIns="91425" anchor="t" anchorCtr="0">
-            <a:spAutoFit/>
-          </a:bodyPr>
-          <a:lstStyle/>
-          <a:p>
-            <a:pPr marL="457200" lvl="0" indent="-317500" algn="l" rtl="0">
-              <a:spcBef>
-                <a:spcPts val="0"/>
-              </a:spcBef>
-              <a:spcAft>
-                <a:spcPts val="0"/>
-              </a:spcAft>
-              <a:buSzPts val="1400"/>
-              <a:buChar char="●"/>
-            </a:pPr>
-            <a:r>
-              <a:rPr lang="en" dirty="0"/>
-              <a:t>~112K images</a:t>
-            </a:r>
-            <a:endParaRPr dirty="0"/>
-          </a:p>
-          <a:p>
-            <a:pPr marL="457200" lvl="0" indent="-317500" algn="l" rtl="0">
-              <a:spcBef>
-                <a:spcPts val="0"/>
-              </a:spcBef>
-              <a:spcAft>
-                <a:spcPts val="0"/>
-              </a:spcAft>
-              <a:buSzPts val="1400"/>
-              <a:buChar char="●"/>
-            </a:pPr>
-            <a:r>
-              <a:rPr lang="en" dirty="0"/>
-              <a:t>Multi-label / class problem</a:t>
-            </a:r>
-            <a:endParaRPr dirty="0"/>
-          </a:p>
-          <a:p>
-            <a:pPr marL="457200" lvl="0" indent="-317500" algn="l" rtl="0">
-              <a:spcBef>
-                <a:spcPts val="0"/>
-              </a:spcBef>
-              <a:spcAft>
-                <a:spcPts val="0"/>
-              </a:spcAft>
-              <a:buSzPts val="1400"/>
-              <a:buChar char="●"/>
-            </a:pPr>
-            <a:r>
-              <a:rPr lang="en" dirty="0"/>
-              <a:t>Huge class imbalance</a:t>
-            </a:r>
-            <a:endParaRPr dirty="0"/>
-          </a:p>
-          <a:p>
-            <a:pPr marL="457200" lvl="0" indent="-317500" algn="l" rtl="0">
-              <a:spcBef>
-                <a:spcPts val="0"/>
-              </a:spcBef>
-              <a:spcAft>
-                <a:spcPts val="0"/>
-              </a:spcAft>
-              <a:buSzPts val="1400"/>
-              <a:buChar char="●"/>
-            </a:pPr>
-            <a:r>
-              <a:rPr lang="en" dirty="0"/>
-              <a:t>Data leakage</a:t>
-            </a:r>
-            <a:endParaRPr dirty="0"/>
           </a:p>
         </p:txBody>
       </p:sp>
@@ -11766,10 +11672,10 @@
               <a:buNone/>
             </a:pPr>
             <a:r>
-              <a:rPr lang="en"/>
-              <a:t>Train &amp; Val AUROC of Best Model</a:t>
+              <a:rPr lang="en" dirty="0"/>
+              <a:t>Train &amp; Val AUROC and Hyperparameter Tuning</a:t>
             </a:r>
-            <a:endParaRPr/>
+            <a:endParaRPr dirty="0"/>
           </a:p>
           <a:p>
             <a:pPr marL="0" lvl="0" indent="0" algn="l" rtl="0">
@@ -11781,7 +11687,7 @@
               </a:spcAft>
               <a:buNone/>
             </a:pPr>
-            <a:endParaRPr/>
+            <a:endParaRPr dirty="0"/>
           </a:p>
         </p:txBody>
       </p:sp>
@@ -11845,10 +11751,10 @@
               <a:buNone/>
             </a:pPr>
             <a:r>
-              <a:rPr lang="en"/>
-              <a:t>Train &amp; Val AUROC of Model with Images from one folder  </a:t>
+              <a:rPr lang="en" dirty="0"/>
+              <a:t>Test Set AUROC and Model  Selection </a:t>
             </a:r>
-            <a:endParaRPr/>
+            <a:endParaRPr dirty="0"/>
           </a:p>
           <a:p>
             <a:pPr marL="0" lvl="0" indent="0" algn="l" rtl="0">
@@ -11860,7 +11766,7 @@
               </a:spcAft>
               <a:buNone/>
             </a:pPr>
-            <a:endParaRPr/>
+            <a:endParaRPr dirty="0"/>
           </a:p>
         </p:txBody>
       </p:sp>

</xml_diff>